<commit_message>
added js files and other resouces
</commit_message>
<xml_diff>
--- a/HTML/HTML.pptx
+++ b/HTML/HTML.pptx
@@ -5,12 +5,12 @@
     <p:sldMasterId id="2147483936" r:id="rId1"/>
   </p:sldMasterIdLst>
   <p:sldIdLst>
-    <p:sldId id="256" r:id="rId2"/>
-    <p:sldId id="257" r:id="rId3"/>
-    <p:sldId id="297" r:id="rId4"/>
-    <p:sldId id="298" r:id="rId5"/>
-    <p:sldId id="291" r:id="rId6"/>
-    <p:sldId id="300" r:id="rId7"/>
+    <p:sldId id="305" r:id="rId2"/>
+    <p:sldId id="256" r:id="rId3"/>
+    <p:sldId id="257" r:id="rId4"/>
+    <p:sldId id="297" r:id="rId5"/>
+    <p:sldId id="298" r:id="rId6"/>
+    <p:sldId id="291" r:id="rId7"/>
     <p:sldId id="299" r:id="rId8"/>
     <p:sldId id="282" r:id="rId9"/>
     <p:sldId id="261" r:id="rId10"/>
@@ -334,7 +334,7 @@
           <a:p>
             <a:fld id="{F6BE6624-8776-452E-9735-08861D03BCD8}" type="datetimeFigureOut">
               <a:rPr lang="fr-CA" smtClean="0"/>
-              <a:t>2020-01-15</a:t>
+              <a:t>2020-01-31</a:t>
             </a:fld>
             <a:endParaRPr lang="fr-CA"/>
           </a:p>
@@ -609,7 +609,7 @@
           <a:p>
             <a:fld id="{F6BE6624-8776-452E-9735-08861D03BCD8}" type="datetimeFigureOut">
               <a:rPr lang="fr-CA" smtClean="0"/>
-              <a:t>2020-01-15</a:t>
+              <a:t>2020-01-31</a:t>
             </a:fld>
             <a:endParaRPr lang="fr-CA"/>
           </a:p>
@@ -803,7 +803,7 @@
           <a:p>
             <a:fld id="{F6BE6624-8776-452E-9735-08861D03BCD8}" type="datetimeFigureOut">
               <a:rPr lang="fr-CA" smtClean="0"/>
-              <a:t>2020-01-15</a:t>
+              <a:t>2020-01-31</a:t>
             </a:fld>
             <a:endParaRPr lang="fr-CA"/>
           </a:p>
@@ -1076,7 +1076,7 @@
           <a:p>
             <a:fld id="{F6BE6624-8776-452E-9735-08861D03BCD8}" type="datetimeFigureOut">
               <a:rPr lang="fr-CA" smtClean="0"/>
-              <a:t>2020-01-15</a:t>
+              <a:t>2020-01-31</a:t>
             </a:fld>
             <a:endParaRPr lang="fr-CA"/>
           </a:p>
@@ -1417,7 +1417,7 @@
           <a:p>
             <a:fld id="{F6BE6624-8776-452E-9735-08861D03BCD8}" type="datetimeFigureOut">
               <a:rPr lang="fr-CA" smtClean="0"/>
-              <a:t>2020-01-15</a:t>
+              <a:t>2020-01-31</a:t>
             </a:fld>
             <a:endParaRPr lang="fr-CA"/>
           </a:p>
@@ -2040,7 +2040,7 @@
           <a:p>
             <a:fld id="{F6BE6624-8776-452E-9735-08861D03BCD8}" type="datetimeFigureOut">
               <a:rPr lang="fr-CA" smtClean="0"/>
-              <a:t>2020-01-15</a:t>
+              <a:t>2020-01-31</a:t>
             </a:fld>
             <a:endParaRPr lang="fr-CA"/>
           </a:p>
@@ -2900,7 +2900,7 @@
           <a:p>
             <a:fld id="{F6BE6624-8776-452E-9735-08861D03BCD8}" type="datetimeFigureOut">
               <a:rPr lang="fr-CA" smtClean="0"/>
-              <a:t>2020-01-15</a:t>
+              <a:t>2020-01-31</a:t>
             </a:fld>
             <a:endParaRPr lang="fr-CA"/>
           </a:p>
@@ -3070,7 +3070,7 @@
           <a:p>
             <a:fld id="{F6BE6624-8776-452E-9735-08861D03BCD8}" type="datetimeFigureOut">
               <a:rPr lang="fr-CA" smtClean="0"/>
-              <a:t>2020-01-15</a:t>
+              <a:t>2020-01-31</a:t>
             </a:fld>
             <a:endParaRPr lang="fr-CA"/>
           </a:p>
@@ -3250,7 +3250,7 @@
           <a:p>
             <a:fld id="{F6BE6624-8776-452E-9735-08861D03BCD8}" type="datetimeFigureOut">
               <a:rPr lang="fr-CA" smtClean="0"/>
-              <a:t>2020-01-15</a:t>
+              <a:t>2020-01-31</a:t>
             </a:fld>
             <a:endParaRPr lang="fr-CA"/>
           </a:p>
@@ -3420,7 +3420,7 @@
           <a:p>
             <a:fld id="{F6BE6624-8776-452E-9735-08861D03BCD8}" type="datetimeFigureOut">
               <a:rPr lang="fr-CA" smtClean="0"/>
-              <a:t>2020-01-15</a:t>
+              <a:t>2020-01-31</a:t>
             </a:fld>
             <a:endParaRPr lang="fr-CA"/>
           </a:p>
@@ -3667,7 +3667,7 @@
           <a:p>
             <a:fld id="{F6BE6624-8776-452E-9735-08861D03BCD8}" type="datetimeFigureOut">
               <a:rPr lang="fr-CA" smtClean="0"/>
-              <a:t>2020-01-15</a:t>
+              <a:t>2020-01-31</a:t>
             </a:fld>
             <a:endParaRPr lang="fr-CA"/>
           </a:p>
@@ -3959,7 +3959,7 @@
           <a:p>
             <a:fld id="{F6BE6624-8776-452E-9735-08861D03BCD8}" type="datetimeFigureOut">
               <a:rPr lang="fr-CA" smtClean="0"/>
-              <a:t>2020-01-15</a:t>
+              <a:t>2020-01-31</a:t>
             </a:fld>
             <a:endParaRPr lang="fr-CA"/>
           </a:p>
@@ -4403,7 +4403,7 @@
           <a:p>
             <a:fld id="{F6BE6624-8776-452E-9735-08861D03BCD8}" type="datetimeFigureOut">
               <a:rPr lang="fr-CA" smtClean="0"/>
-              <a:t>2020-01-15</a:t>
+              <a:t>2020-01-31</a:t>
             </a:fld>
             <a:endParaRPr lang="fr-CA"/>
           </a:p>
@@ -4521,7 +4521,7 @@
           <a:p>
             <a:fld id="{F6BE6624-8776-452E-9735-08861D03BCD8}" type="datetimeFigureOut">
               <a:rPr lang="fr-CA" smtClean="0"/>
-              <a:t>2020-01-15</a:t>
+              <a:t>2020-01-31</a:t>
             </a:fld>
             <a:endParaRPr lang="fr-CA"/>
           </a:p>
@@ -4616,7 +4616,7 @@
           <a:p>
             <a:fld id="{F6BE6624-8776-452E-9735-08861D03BCD8}" type="datetimeFigureOut">
               <a:rPr lang="fr-CA" smtClean="0"/>
-              <a:t>2020-01-15</a:t>
+              <a:t>2020-01-31</a:t>
             </a:fld>
             <a:endParaRPr lang="fr-CA"/>
           </a:p>
@@ -4895,7 +4895,7 @@
           <a:p>
             <a:fld id="{F6BE6624-8776-452E-9735-08861D03BCD8}" type="datetimeFigureOut">
               <a:rPr lang="fr-CA" smtClean="0"/>
-              <a:t>2020-01-15</a:t>
+              <a:t>2020-01-31</a:t>
             </a:fld>
             <a:endParaRPr lang="fr-CA"/>
           </a:p>
@@ -5170,7 +5170,7 @@
           <a:p>
             <a:fld id="{F6BE6624-8776-452E-9735-08861D03BCD8}" type="datetimeFigureOut">
               <a:rPr lang="fr-CA" smtClean="0"/>
-              <a:t>2020-01-15</a:t>
+              <a:t>2020-01-31</a:t>
             </a:fld>
             <a:endParaRPr lang="fr-CA"/>
           </a:p>
@@ -5599,7 +5599,7 @@
           <a:p>
             <a:fld id="{F6BE6624-8776-452E-9735-08861D03BCD8}" type="datetimeFigureOut">
               <a:rPr lang="fr-CA" smtClean="0"/>
-              <a:t>2020-01-15</a:t>
+              <a:t>2020-01-31</a:t>
             </a:fld>
             <a:endParaRPr lang="fr-CA"/>
           </a:p>
@@ -6132,7 +6132,7 @@
           <p:cNvPr id="2" name="Titre 1">
             <a:extLst>
               <a:ext uri="{FF2B5EF4-FFF2-40B4-BE49-F238E27FC236}">
-                <a16:creationId xmlns:a16="http://schemas.microsoft.com/office/drawing/2014/main" id="{F484858E-E8EB-4263-9827-22EBEA1B04A4}"/>
+                <a16:creationId xmlns:a16="http://schemas.microsoft.com/office/drawing/2014/main" id="{B8395A03-613B-468D-BE6B-12239237A472}"/>
               </a:ext>
             </a:extLst>
           </p:cNvPr>
@@ -6140,50 +6140,91 @@
             <a:spLocks noGrp="1"/>
           </p:cNvSpPr>
           <p:nvPr>
-            <p:ph type="ctrTitle"/>
+            <p:ph type="title"/>
           </p:nvPr>
         </p:nvSpPr>
         <p:spPr>
           <a:xfrm>
-            <a:off x="1154955" y="1447800"/>
-            <a:ext cx="8825658" cy="2830901"/>
+            <a:off x="1103312" y="422238"/>
+            <a:ext cx="9404723" cy="1056042"/>
           </a:xfrm>
         </p:spPr>
         <p:txBody>
           <a:bodyPr/>
           <a:lstStyle/>
           <a:p>
-            <a:br>
-              <a:rPr lang="en" dirty="0">
-                <a:latin typeface="Calibri" panose="020F0502020204030204" pitchFamily="34" charset="0"/>
-              </a:rPr>
-            </a:br>
-            <a:br>
-              <a:rPr lang="en" dirty="0">
-                <a:latin typeface="Calibri" panose="020F0502020204030204" pitchFamily="34" charset="0"/>
-              </a:rPr>
-            </a:br>
-            <a:br>
-              <a:rPr lang="en" dirty="0">
-                <a:latin typeface="Calibri" panose="020F0502020204030204" pitchFamily="34" charset="0"/>
-              </a:rPr>
-            </a:br>
-            <a:r>
-              <a:rPr lang="en" dirty="0">
-                <a:latin typeface="Calibri" panose="020F0502020204030204" pitchFamily="34" charset="0"/>
-              </a:rPr>
-              <a:t>Introduction</a:t>
-            </a:r>
-            <a:br>
-              <a:rPr lang="en" dirty="0">
-                <a:latin typeface="Calibri" panose="020F0502020204030204" pitchFamily="34" charset="0"/>
-              </a:rPr>
-            </a:br>
-            <a:r>
-              <a:rPr lang="fr-CA" dirty="0">
-                <a:latin typeface="Calibri" panose="020F0502020204030204" pitchFamily="34" charset="0"/>
-              </a:rPr>
-              <a:t>HTML</a:t>
+            <a:pPr algn="ctr"/>
+            <a:r>
+              <a:rPr lang="fr-CA" sz="4400" dirty="0">
+                <a:latin typeface="Calibri" panose="020F0502020204030204" pitchFamily="34" charset="0"/>
+              </a:rPr>
+              <a:t>This course is brought to you by</a:t>
+            </a:r>
+          </a:p>
+        </p:txBody>
+      </p:sp>
+      <p:sp>
+        <p:nvSpPr>
+          <p:cNvPr id="3" name="Espace réservé du contenu 2">
+            <a:extLst>
+              <a:ext uri="{FF2B5EF4-FFF2-40B4-BE49-F238E27FC236}">
+                <a16:creationId xmlns:a16="http://schemas.microsoft.com/office/drawing/2014/main" id="{0D8A3786-9BD3-4728-A1B5-829B6DC31A28}"/>
+              </a:ext>
+            </a:extLst>
+          </p:cNvPr>
+          <p:cNvSpPr>
+            <a:spLocks noGrp="1"/>
+          </p:cNvSpPr>
+          <p:nvPr>
+            <p:ph idx="1"/>
+          </p:nvPr>
+        </p:nvSpPr>
+        <p:spPr>
+          <a:xfrm>
+            <a:off x="1103312" y="1737360"/>
+            <a:ext cx="10326688" cy="4511039"/>
+          </a:xfrm>
+        </p:spPr>
+        <p:txBody>
+          <a:bodyPr>
+            <a:normAutofit/>
+          </a:bodyPr>
+          <a:lstStyle/>
+          <a:p>
+            <a:pPr marL="0" indent="0" algn="ctr">
+              <a:buNone/>
+            </a:pPr>
+            <a:r>
+              <a:rPr lang="fr-CA" sz="8000" dirty="0">
+                <a:solidFill>
+                  <a:srgbClr val="FFC000"/>
+                </a:solidFill>
+                <a:latin typeface="Calibri" panose="020F0502020204030204" pitchFamily="34" charset="0"/>
+              </a:rPr>
+              <a:t>Code Preach</a:t>
+            </a:r>
+          </a:p>
+          <a:p>
+            <a:pPr marL="0" indent="0">
+              <a:buNone/>
+            </a:pPr>
+            <a:endParaRPr lang="fr-CA" sz="3200" dirty="0">
+              <a:latin typeface="Calibri" panose="020F0502020204030204" pitchFamily="34" charset="0"/>
+            </a:endParaRPr>
+          </a:p>
+          <a:p>
+            <a:pPr marL="0" indent="0" algn="ctr">
+              <a:buNone/>
+            </a:pPr>
+            <a:r>
+              <a:rPr lang="fr-CA" sz="3200" dirty="0">
+                <a:latin typeface="Calibri" panose="020F0502020204030204" pitchFamily="34" charset="0"/>
+              </a:rPr>
+              <a:t>Learn to code mobile </a:t>
+            </a:r>
+            <a:r>
+              <a:rPr lang="fr-CA" sz="3200" dirty="0"/>
+              <a:t>and web applications </a:t>
             </a:r>
           </a:p>
         </p:txBody>
@@ -6191,7 +6232,7 @@
     </p:spTree>
     <p:extLst>
       <p:ext uri="{BB962C8B-B14F-4D97-AF65-F5344CB8AC3E}">
-        <p14:creationId xmlns:p14="http://schemas.microsoft.com/office/powerpoint/2010/main" val="1213760627"/>
+        <p14:creationId xmlns:p14="http://schemas.microsoft.com/office/powerpoint/2010/main" val="4272318046"/>
       </p:ext>
     </p:extLst>
   </p:cSld>
@@ -8733,7 +8774,7 @@
           <p:cNvPr id="2" name="Titre 1">
             <a:extLst>
               <a:ext uri="{FF2B5EF4-FFF2-40B4-BE49-F238E27FC236}">
-                <a16:creationId xmlns:a16="http://schemas.microsoft.com/office/drawing/2014/main" id="{13785DC4-CB79-4F95-A266-1B3F9CC12801}"/>
+                <a16:creationId xmlns:a16="http://schemas.microsoft.com/office/drawing/2014/main" id="{F484858E-E8EB-4263-9827-22EBEA1B04A4}"/>
               </a:ext>
             </a:extLst>
           </p:cNvPr>
@@ -8741,164 +8782,58 @@
             <a:spLocks noGrp="1"/>
           </p:cNvSpPr>
           <p:nvPr>
-            <p:ph type="title"/>
+            <p:ph type="ctrTitle"/>
           </p:nvPr>
         </p:nvSpPr>
         <p:spPr>
           <a:xfrm>
-            <a:off x="646111" y="452718"/>
-            <a:ext cx="9404723" cy="1220807"/>
+            <a:off x="1154955" y="1447800"/>
+            <a:ext cx="8825658" cy="2830901"/>
           </a:xfrm>
         </p:spPr>
         <p:txBody>
           <a:bodyPr/>
           <a:lstStyle/>
           <a:p>
-            <a:pPr algn="ctr"/>
-            <a:r>
-              <a:rPr lang="fr-CA" sz="4400" dirty="0">
-                <a:latin typeface="Calibri" panose="020F0502020204030204" pitchFamily="34" charset="0"/>
-              </a:rPr>
-              <a:t>Definition: </a:t>
-            </a:r>
-            <a:r>
-              <a:rPr lang="fr-CA" sz="4400" dirty="0">
-                <a:solidFill>
-                  <a:srgbClr val="00B0F0"/>
-                </a:solidFill>
+            <a:br>
+              <a:rPr lang="en" dirty="0">
+                <a:latin typeface="Calibri" panose="020F0502020204030204" pitchFamily="34" charset="0"/>
+              </a:rPr>
+            </a:br>
+            <a:br>
+              <a:rPr lang="en" dirty="0">
+                <a:latin typeface="Calibri" panose="020F0502020204030204" pitchFamily="34" charset="0"/>
+              </a:rPr>
+            </a:br>
+            <a:br>
+              <a:rPr lang="en" dirty="0">
+                <a:latin typeface="Calibri" panose="020F0502020204030204" pitchFamily="34" charset="0"/>
+              </a:rPr>
+            </a:br>
+            <a:r>
+              <a:rPr lang="en" dirty="0">
+                <a:latin typeface="Calibri" panose="020F0502020204030204" pitchFamily="34" charset="0"/>
+              </a:rPr>
+              <a:t>Introduction</a:t>
+            </a:r>
+            <a:br>
+              <a:rPr lang="en" dirty="0">
+                <a:latin typeface="Calibri" panose="020F0502020204030204" pitchFamily="34" charset="0"/>
+              </a:rPr>
+            </a:br>
+            <a:r>
+              <a:rPr lang="fr-CA" dirty="0">
                 <a:latin typeface="Calibri" panose="020F0502020204030204" pitchFamily="34" charset="0"/>
               </a:rPr>
               <a:t>HTML</a:t>
             </a:r>
-          </a:p>
-        </p:txBody>
-      </p:sp>
-      <p:sp>
-        <p:nvSpPr>
-          <p:cNvPr id="3" name="Espace réservé du contenu 2">
-            <a:extLst>
-              <a:ext uri="{FF2B5EF4-FFF2-40B4-BE49-F238E27FC236}">
-                <a16:creationId xmlns:a16="http://schemas.microsoft.com/office/drawing/2014/main" id="{5C2F2FFB-ADB3-4CF2-8A3B-4F5CB5C406CE}"/>
-              </a:ext>
-            </a:extLst>
-          </p:cNvPr>
-          <p:cNvSpPr>
-            <a:spLocks noGrp="1"/>
-          </p:cNvSpPr>
-          <p:nvPr>
-            <p:ph idx="1"/>
-          </p:nvPr>
-        </p:nvSpPr>
-        <p:spPr>
-          <a:xfrm>
-            <a:off x="1103312" y="2052918"/>
-            <a:ext cx="9627948" cy="4195481"/>
-          </a:xfrm>
-        </p:spPr>
-        <p:txBody>
-          <a:bodyPr>
-            <a:normAutofit/>
-          </a:bodyPr>
-          <a:lstStyle/>
-          <a:p>
-            <a:pPr marL="0" indent="0">
-              <a:buNone/>
-            </a:pPr>
-            <a:r>
-              <a:rPr lang="fr-CA" sz="4000" dirty="0">
-                <a:solidFill>
-                  <a:srgbClr val="00B0F0"/>
-                </a:solidFill>
-                <a:latin typeface="Calibri" panose="020F0502020204030204" pitchFamily="34" charset="0"/>
-              </a:rPr>
-              <a:t>H</a:t>
-            </a:r>
-            <a:r>
-              <a:rPr lang="fr-CA" sz="3200" dirty="0">
-                <a:latin typeface="Calibri" panose="020F0502020204030204" pitchFamily="34" charset="0"/>
-              </a:rPr>
-              <a:t>yper </a:t>
-            </a:r>
-            <a:r>
-              <a:rPr lang="fr-CA" sz="4000" dirty="0">
-                <a:solidFill>
-                  <a:srgbClr val="00B0F0"/>
-                </a:solidFill>
-                <a:latin typeface="Calibri" panose="020F0502020204030204" pitchFamily="34" charset="0"/>
-              </a:rPr>
-              <a:t>T</a:t>
-            </a:r>
-            <a:r>
-              <a:rPr lang="fr-CA" sz="3200" dirty="0">
-                <a:latin typeface="Calibri" panose="020F0502020204030204" pitchFamily="34" charset="0"/>
-              </a:rPr>
-              <a:t>ext </a:t>
-            </a:r>
-            <a:r>
-              <a:rPr lang="fr-CA" sz="4000" dirty="0">
-                <a:solidFill>
-                  <a:srgbClr val="00B0F0"/>
-                </a:solidFill>
-                <a:latin typeface="Calibri" panose="020F0502020204030204" pitchFamily="34" charset="0"/>
-              </a:rPr>
-              <a:t>M</a:t>
-            </a:r>
-            <a:r>
-              <a:rPr lang="fr-CA" sz="3200" dirty="0">
-                <a:latin typeface="Calibri" panose="020F0502020204030204" pitchFamily="34" charset="0"/>
-              </a:rPr>
-              <a:t>arkup </a:t>
-            </a:r>
-            <a:r>
-              <a:rPr lang="fr-CA" sz="4000" dirty="0">
-                <a:solidFill>
-                  <a:srgbClr val="00B0F0"/>
-                </a:solidFill>
-                <a:latin typeface="Calibri" panose="020F0502020204030204" pitchFamily="34" charset="0"/>
-              </a:rPr>
-              <a:t>L</a:t>
-            </a:r>
-            <a:r>
-              <a:rPr lang="fr-CA" sz="3200" dirty="0">
-                <a:latin typeface="Calibri" panose="020F0502020204030204" pitchFamily="34" charset="0"/>
-              </a:rPr>
-              <a:t>anguage = </a:t>
-            </a:r>
-            <a:r>
-              <a:rPr lang="fr-CA" sz="3200" dirty="0">
-                <a:solidFill>
-                  <a:srgbClr val="00B0F0"/>
-                </a:solidFill>
-                <a:latin typeface="Calibri" panose="020F0502020204030204" pitchFamily="34" charset="0"/>
-              </a:rPr>
-              <a:t>HTML</a:t>
-            </a:r>
-          </a:p>
-          <a:p>
-            <a:pPr marL="0" indent="0">
-              <a:buNone/>
-            </a:pPr>
-            <a:endParaRPr lang="fr-CA" sz="3200" dirty="0">
-              <a:latin typeface="Calibri" panose="020F0502020204030204" pitchFamily="34" charset="0"/>
-            </a:endParaRPr>
-          </a:p>
-          <a:p>
-            <a:r>
-              <a:rPr lang="en-US" sz="3200" dirty="0">
-                <a:latin typeface="Calibri" panose="020F0502020204030204" pitchFamily="34" charset="0"/>
-              </a:rPr>
-              <a:t> It consists of a series of codes used to structure texts, images, and other content to be displayed in a browser.</a:t>
-            </a:r>
-            <a:endParaRPr lang="fr-CA" sz="3200" dirty="0">
-              <a:latin typeface="Calibri" panose="020F0502020204030204" pitchFamily="34" charset="0"/>
-            </a:endParaRPr>
           </a:p>
         </p:txBody>
       </p:sp>
     </p:spTree>
     <p:extLst>
       <p:ext uri="{BB962C8B-B14F-4D97-AF65-F5344CB8AC3E}">
-        <p14:creationId xmlns:p14="http://schemas.microsoft.com/office/powerpoint/2010/main" val="85797257"/>
+        <p14:creationId xmlns:p14="http://schemas.microsoft.com/office/powerpoint/2010/main" val="1213760627"/>
       </p:ext>
     </p:extLst>
   </p:cSld>
@@ -10580,7 +10515,7 @@
         </p:nvSpPr>
         <p:spPr>
           <a:xfrm>
-            <a:off x="646111" y="452718"/>
+            <a:off x="981391" y="163902"/>
             <a:ext cx="9404723" cy="979267"/>
           </a:xfrm>
         </p:spPr>
@@ -10620,8 +10555,8 @@
         </p:nvSpPr>
         <p:spPr>
           <a:xfrm>
-            <a:off x="327804" y="1431986"/>
-            <a:ext cx="11025995" cy="5262112"/>
+            <a:off x="343044" y="1143168"/>
+            <a:ext cx="11025995" cy="5440511"/>
           </a:xfrm>
         </p:spPr>
         <p:txBody>
@@ -10817,7 +10752,7 @@
         </p:nvSpPr>
         <p:spPr>
           <a:xfrm>
-            <a:off x="715122" y="329426"/>
+            <a:off x="928482" y="129396"/>
             <a:ext cx="9404723" cy="703222"/>
           </a:xfrm>
         </p:spPr>
@@ -10857,8 +10792,8 @@
         </p:nvSpPr>
         <p:spPr>
           <a:xfrm>
-            <a:off x="396815" y="1362974"/>
-            <a:ext cx="11404121" cy="5365630"/>
+            <a:off x="396815" y="1143000"/>
+            <a:ext cx="11404121" cy="5585604"/>
           </a:xfrm>
         </p:spPr>
         <p:txBody>
@@ -11032,7 +10967,7 @@
         </p:nvSpPr>
         <p:spPr>
           <a:xfrm>
-            <a:off x="646111" y="452718"/>
+            <a:off x="728496" y="285078"/>
             <a:ext cx="10568229" cy="979267"/>
           </a:xfrm>
         </p:spPr>
@@ -11072,7 +11007,7 @@
         </p:nvSpPr>
         <p:spPr>
           <a:xfrm>
-            <a:off x="345057" y="1431986"/>
+            <a:off x="345055" y="1264345"/>
             <a:ext cx="11335109" cy="5426014"/>
           </a:xfrm>
         </p:spPr>
@@ -11206,7 +11141,7 @@
           <p:cNvPr id="2" name="Titre 1">
             <a:extLst>
               <a:ext uri="{FF2B5EF4-FFF2-40B4-BE49-F238E27FC236}">
-                <a16:creationId xmlns:a16="http://schemas.microsoft.com/office/drawing/2014/main" id="{E2A56FD1-3BD0-4AC6-BB79-5313B92C0508}"/>
+                <a16:creationId xmlns:a16="http://schemas.microsoft.com/office/drawing/2014/main" id="{13785DC4-CB79-4F95-A266-1B3F9CC12801}"/>
               </a:ext>
             </a:extLst>
           </p:cNvPr>
@@ -11219,8 +11154,8 @@
         </p:nvSpPr>
         <p:spPr>
           <a:xfrm>
-            <a:off x="738126" y="297443"/>
-            <a:ext cx="9860863" cy="875750"/>
+            <a:off x="646111" y="452718"/>
+            <a:ext cx="9404723" cy="1220807"/>
           </a:xfrm>
         </p:spPr>
         <p:txBody>
@@ -11229,17 +11164,20 @@
           <a:p>
             <a:pPr algn="ctr"/>
             <a:r>
-              <a:rPr lang="en" sz="4400" dirty="0">
-                <a:solidFill>
-                  <a:srgbClr val="FFFFFF"/>
-                </a:solidFill>
-                <a:latin typeface="Calibri" panose="020F0502020204030204" pitchFamily="34" charset="0"/>
-              </a:rPr>
-              <a:t>Anatomy of an HTML page</a:t>
-            </a:r>
-            <a:endParaRPr lang="fr-CA" sz="4400" dirty="0">
-              <a:latin typeface="Calibri" panose="020F0502020204030204" pitchFamily="34" charset="0"/>
-            </a:endParaRPr>
+              <a:rPr lang="fr-CA" sz="4400" dirty="0">
+                <a:latin typeface="Calibri" panose="020F0502020204030204" pitchFamily="34" charset="0"/>
+              </a:rPr>
+              <a:t>Definition: </a:t>
+            </a:r>
+            <a:r>
+              <a:rPr lang="fr-CA" sz="4400" dirty="0">
+                <a:solidFill>
+                  <a:srgbClr val="00B0F0"/>
+                </a:solidFill>
+                <a:latin typeface="Calibri" panose="020F0502020204030204" pitchFamily="34" charset="0"/>
+              </a:rPr>
+              <a:t>HTML</a:t>
+            </a:r>
           </a:p>
         </p:txBody>
       </p:sp>
@@ -11248,7 +11186,7 @@
           <p:cNvPr id="3" name="Espace réservé du contenu 2">
             <a:extLst>
               <a:ext uri="{FF2B5EF4-FFF2-40B4-BE49-F238E27FC236}">
-                <a16:creationId xmlns:a16="http://schemas.microsoft.com/office/drawing/2014/main" id="{0D5B584C-A07D-465C-B72B-EC552730608D}"/>
+                <a16:creationId xmlns:a16="http://schemas.microsoft.com/office/drawing/2014/main" id="{5C2F2FFB-ADB3-4CF2-8A3B-4F5CB5C406CE}"/>
               </a:ext>
             </a:extLst>
           </p:cNvPr>
@@ -11261,161 +11199,114 @@
         </p:nvSpPr>
         <p:spPr>
           <a:xfrm>
-            <a:off x="646111" y="1500996"/>
-            <a:ext cx="10792515" cy="4747403"/>
+            <a:off x="1103312" y="2052918"/>
+            <a:ext cx="9627948" cy="4195481"/>
           </a:xfrm>
         </p:spPr>
         <p:txBody>
-          <a:bodyPr/>
+          <a:bodyPr>
+            <a:normAutofit/>
+          </a:bodyPr>
           <a:lstStyle/>
           <a:p>
-            <a:pPr lvl="0">
-              <a:lnSpc>
-                <a:spcPct val="115000"/>
-              </a:lnSpc>
-              <a:spcBef>
-                <a:spcPts val="0"/>
-              </a:spcBef>
+            <a:pPr marL="0" indent="0">
               <a:buNone/>
             </a:pPr>
             <a:r>
-              <a:rPr lang="en" sz="3200" dirty="0">
-                <a:latin typeface="Calibri" panose="020F0502020204030204" pitchFamily="34" charset="0"/>
-                <a:ea typeface="Roboto Slab"/>
-                <a:cs typeface="Roboto Slab"/>
-                <a:sym typeface="Roboto Slab"/>
-              </a:rPr>
-              <a:t>A web page is made up of 3 major sections:</a:t>
-            </a:r>
-          </a:p>
-          <a:p>
-            <a:pPr lvl="0">
-              <a:lnSpc>
-                <a:spcPct val="115000"/>
-              </a:lnSpc>
-              <a:spcBef>
-                <a:spcPts val="0"/>
-              </a:spcBef>
+              <a:rPr lang="fr-CA" sz="4000" dirty="0">
+                <a:solidFill>
+                  <a:srgbClr val="00B0F0"/>
+                </a:solidFill>
+                <a:latin typeface="Calibri" panose="020F0502020204030204" pitchFamily="34" charset="0"/>
+              </a:rPr>
+              <a:t>H</a:t>
+            </a:r>
+            <a:r>
+              <a:rPr lang="fr-CA" sz="3200" dirty="0">
+                <a:latin typeface="Calibri" panose="020F0502020204030204" pitchFamily="34" charset="0"/>
+              </a:rPr>
+              <a:t>yper </a:t>
+            </a:r>
+            <a:r>
+              <a:rPr lang="fr-CA" sz="4000" dirty="0">
+                <a:solidFill>
+                  <a:srgbClr val="00B0F0"/>
+                </a:solidFill>
+                <a:latin typeface="Calibri" panose="020F0502020204030204" pitchFamily="34" charset="0"/>
+              </a:rPr>
+              <a:t>T</a:t>
+            </a:r>
+            <a:r>
+              <a:rPr lang="fr-CA" sz="3200" dirty="0">
+                <a:latin typeface="Calibri" panose="020F0502020204030204" pitchFamily="34" charset="0"/>
+              </a:rPr>
+              <a:t>ext </a:t>
+            </a:r>
+            <a:r>
+              <a:rPr lang="fr-CA" sz="4000" dirty="0">
+                <a:solidFill>
+                  <a:srgbClr val="00B0F0"/>
+                </a:solidFill>
+                <a:latin typeface="Calibri" panose="020F0502020204030204" pitchFamily="34" charset="0"/>
+              </a:rPr>
+              <a:t>M</a:t>
+            </a:r>
+            <a:r>
+              <a:rPr lang="fr-CA" sz="3200" dirty="0">
+                <a:latin typeface="Calibri" panose="020F0502020204030204" pitchFamily="34" charset="0"/>
+              </a:rPr>
+              <a:t>arkup </a:t>
+            </a:r>
+            <a:r>
+              <a:rPr lang="fr-CA" sz="4000" dirty="0">
+                <a:solidFill>
+                  <a:srgbClr val="00B0F0"/>
+                </a:solidFill>
+                <a:latin typeface="Calibri" panose="020F0502020204030204" pitchFamily="34" charset="0"/>
+              </a:rPr>
+              <a:t>L</a:t>
+            </a:r>
+            <a:r>
+              <a:rPr lang="fr-CA" sz="3200" dirty="0">
+                <a:latin typeface="Calibri" panose="020F0502020204030204" pitchFamily="34" charset="0"/>
+              </a:rPr>
+              <a:t>anguage = </a:t>
+            </a:r>
+            <a:r>
+              <a:rPr lang="fr-CA" sz="3200" dirty="0">
+                <a:solidFill>
+                  <a:srgbClr val="00B0F0"/>
+                </a:solidFill>
+                <a:latin typeface="Calibri" panose="020F0502020204030204" pitchFamily="34" charset="0"/>
+              </a:rPr>
+              <a:t>HTML</a:t>
+            </a:r>
+          </a:p>
+          <a:p>
+            <a:pPr marL="0" indent="0">
               <a:buNone/>
             </a:pPr>
-            <a:endParaRPr lang="en" sz="3200" dirty="0">
+            <a:endParaRPr lang="fr-CA" sz="3200" dirty="0">
               <a:latin typeface="Calibri" panose="020F0502020204030204" pitchFamily="34" charset="0"/>
-              <a:ea typeface="Roboto Slab"/>
-              <a:cs typeface="Roboto Slab"/>
-              <a:sym typeface="Roboto Slab"/>
             </a:endParaRPr>
           </a:p>
           <a:p>
-            <a:pPr marL="457200" lvl="0" indent="-381000">
-              <a:lnSpc>
-                <a:spcPct val="115000"/>
-              </a:lnSpc>
-              <a:spcBef>
-                <a:spcPts val="0"/>
-              </a:spcBef>
-              <a:buSzPct val="100000"/>
-              <a:buFont typeface="Roboto Slab"/>
-              <a:buChar char="●"/>
-            </a:pPr>
-            <a:r>
-              <a:rPr lang="en" sz="3200" dirty="0">
-                <a:solidFill>
-                  <a:srgbClr val="00B0F0"/>
-                </a:solidFill>
-                <a:latin typeface="Calibri" panose="020F0502020204030204" pitchFamily="34" charset="0"/>
-                <a:ea typeface="Roboto Slab"/>
-                <a:cs typeface="Roboto Slab"/>
-                <a:sym typeface="Roboto Slab"/>
-              </a:rPr>
-              <a:t>head</a:t>
-            </a:r>
-            <a:r>
-              <a:rPr lang="en" sz="3200" dirty="0">
-                <a:latin typeface="Calibri" panose="020F0502020204030204" pitchFamily="34" charset="0"/>
-                <a:ea typeface="Roboto Slab"/>
-                <a:cs typeface="Roboto Slab"/>
-                <a:sym typeface="Roboto Slab"/>
-              </a:rPr>
-              <a:t> - You don’t see the content in here. Defines rules for the page.</a:t>
-            </a:r>
-          </a:p>
-          <a:p>
-            <a:pPr marL="457200" lvl="0" indent="-381000">
-              <a:lnSpc>
-                <a:spcPct val="115000"/>
-              </a:lnSpc>
-              <a:spcBef>
-                <a:spcPts val="0"/>
-              </a:spcBef>
-              <a:buSzPct val="100000"/>
-              <a:buFont typeface="Roboto Slab"/>
-              <a:buChar char="●"/>
-            </a:pPr>
-            <a:r>
-              <a:rPr lang="en" sz="3200" dirty="0">
-                <a:solidFill>
-                  <a:srgbClr val="00B0F0"/>
-                </a:solidFill>
-                <a:latin typeface="Calibri" panose="020F0502020204030204" pitchFamily="34" charset="0"/>
-                <a:ea typeface="Roboto Slab"/>
-                <a:cs typeface="Roboto Slab"/>
-                <a:sym typeface="Roboto Slab"/>
-              </a:rPr>
-              <a:t>body</a:t>
-            </a:r>
-            <a:r>
-              <a:rPr lang="en" sz="3200" dirty="0">
-                <a:latin typeface="Calibri" panose="020F0502020204030204" pitchFamily="34" charset="0"/>
-                <a:ea typeface="Roboto Slab"/>
-                <a:cs typeface="Roboto Slab"/>
-                <a:sym typeface="Roboto Slab"/>
-              </a:rPr>
-              <a:t> - Everything visible goes here. This is where most of your time will be spent.</a:t>
-            </a:r>
-          </a:p>
-          <a:p>
-            <a:pPr marL="457200" lvl="0" indent="-381000">
-              <a:lnSpc>
-                <a:spcPct val="115000"/>
-              </a:lnSpc>
-              <a:spcBef>
-                <a:spcPts val="0"/>
-              </a:spcBef>
-              <a:buSzPct val="100000"/>
-              <a:buFont typeface="Roboto Slab"/>
-              <a:buChar char="●"/>
-            </a:pPr>
-            <a:r>
-              <a:rPr lang="en" sz="3200" dirty="0">
-                <a:solidFill>
-                  <a:srgbClr val="00B0F0"/>
-                </a:solidFill>
-                <a:latin typeface="Calibri" panose="020F0502020204030204" pitchFamily="34" charset="0"/>
-                <a:ea typeface="Roboto Slab"/>
-                <a:cs typeface="Roboto Slab"/>
-                <a:sym typeface="Roboto Slab"/>
-              </a:rPr>
-              <a:t>html </a:t>
-            </a:r>
-            <a:r>
-              <a:rPr lang="en" sz="3200" dirty="0">
-                <a:latin typeface="Calibri" panose="020F0502020204030204" pitchFamily="34" charset="0"/>
-                <a:ea typeface="Roboto Slab"/>
-                <a:cs typeface="Roboto Slab"/>
-                <a:sym typeface="Roboto Slab"/>
-              </a:rPr>
-              <a:t>- Wraps around everything else. Head/Body go inside the html tag.</a:t>
-            </a:r>
-          </a:p>
-          <a:p>
-            <a:endParaRPr lang="fr-CA" dirty="0"/>
+            <a:r>
+              <a:rPr lang="en-US" sz="3200" dirty="0">
+                <a:latin typeface="Calibri" panose="020F0502020204030204" pitchFamily="34" charset="0"/>
+              </a:rPr>
+              <a:t> It consists of a series of codes used to structure texts, images, and other content to be displayed in a browser.</a:t>
+            </a:r>
+            <a:endParaRPr lang="fr-CA" sz="3200" dirty="0">
+              <a:latin typeface="Calibri" panose="020F0502020204030204" pitchFamily="34" charset="0"/>
+            </a:endParaRPr>
           </a:p>
         </p:txBody>
       </p:sp>
     </p:spTree>
     <p:extLst>
       <p:ext uri="{BB962C8B-B14F-4D97-AF65-F5344CB8AC3E}">
-        <p14:creationId xmlns:p14="http://schemas.microsoft.com/office/powerpoint/2010/main" val="3851042821"/>
+        <p14:creationId xmlns:p14="http://schemas.microsoft.com/office/powerpoint/2010/main" val="85797257"/>
       </p:ext>
     </p:extLst>
   </p:cSld>
@@ -12902,8 +12793,8 @@
         </p:nvSpPr>
         <p:spPr>
           <a:xfrm>
-            <a:off x="477608" y="822960"/>
-            <a:ext cx="9404723" cy="4617720"/>
+            <a:off x="416648" y="1813560"/>
+            <a:ext cx="9404723" cy="2346960"/>
           </a:xfrm>
         </p:spPr>
         <p:txBody>
@@ -12920,22 +12811,6 @@
                 <a:latin typeface="Calibri" panose="020F0502020204030204" pitchFamily="34" charset="0"/>
               </a:rPr>
               <a:t>End</a:t>
-            </a:r>
-            <a:br>
-              <a:rPr lang="fr-CA" sz="7200" dirty="0">
-                <a:latin typeface="Calibri" panose="020F0502020204030204" pitchFamily="34" charset="0"/>
-              </a:rPr>
-            </a:br>
-            <a:br>
-              <a:rPr lang="fr-CA" sz="7200" dirty="0">
-                <a:latin typeface="Calibri" panose="020F0502020204030204" pitchFamily="34" charset="0"/>
-              </a:rPr>
-            </a:br>
-            <a:r>
-              <a:rPr lang="fr-CA" sz="7200" dirty="0">
-                <a:latin typeface="Calibri" panose="020F0502020204030204" pitchFamily="34" charset="0"/>
-              </a:rPr>
-              <a:t>Practice Time</a:t>
             </a:r>
           </a:p>
         </p:txBody>
@@ -12975,7 +12850,7 @@
           <p:cNvPr id="2" name="Titre 1">
             <a:extLst>
               <a:ext uri="{FF2B5EF4-FFF2-40B4-BE49-F238E27FC236}">
-                <a16:creationId xmlns:a16="http://schemas.microsoft.com/office/drawing/2014/main" id="{7CA54ABA-7E45-4FCC-A2AC-CA4570B89A83}"/>
+                <a16:creationId xmlns:a16="http://schemas.microsoft.com/office/drawing/2014/main" id="{E2A56FD1-3BD0-4AC6-BB79-5313B92C0508}"/>
               </a:ext>
             </a:extLst>
           </p:cNvPr>
@@ -12988,8 +12863,8 @@
         </p:nvSpPr>
         <p:spPr>
           <a:xfrm>
-            <a:off x="646111" y="452718"/>
-            <a:ext cx="9671081" cy="1100037"/>
+            <a:off x="738126" y="297443"/>
+            <a:ext cx="9860863" cy="875750"/>
           </a:xfrm>
         </p:spPr>
         <p:txBody>
@@ -13004,16 +12879,7 @@
                 </a:solidFill>
                 <a:latin typeface="Calibri" panose="020F0502020204030204" pitchFamily="34" charset="0"/>
               </a:rPr>
-              <a:t>The skeleton/ </a:t>
-            </a:r>
-            <a:r>
-              <a:rPr lang="fr-CA" sz="4400" dirty="0">
-                <a:solidFill>
-                  <a:srgbClr val="FFFFFF"/>
-                </a:solidFill>
-                <a:latin typeface="Calibri" panose="020F0502020204030204" pitchFamily="34" charset="0"/>
-              </a:rPr>
-              <a:t>Format</a:t>
+              <a:t>Anatomy of an HTML page</a:t>
             </a:r>
             <a:endParaRPr lang="fr-CA" sz="4400" dirty="0">
               <a:latin typeface="Calibri" panose="020F0502020204030204" pitchFamily="34" charset="0"/>
@@ -13026,7 +12892,7 @@
           <p:cNvPr id="3" name="Espace réservé du contenu 2">
             <a:extLst>
               <a:ext uri="{FF2B5EF4-FFF2-40B4-BE49-F238E27FC236}">
-                <a16:creationId xmlns:a16="http://schemas.microsoft.com/office/drawing/2014/main" id="{B76E426F-E1E9-42F7-A355-5D674FA1AC86}"/>
+                <a16:creationId xmlns:a16="http://schemas.microsoft.com/office/drawing/2014/main" id="{0D5B584C-A07D-465C-B72B-EC552730608D}"/>
               </a:ext>
             </a:extLst>
           </p:cNvPr>
@@ -13039,14 +12905,12 @@
         </p:nvSpPr>
         <p:spPr>
           <a:xfrm>
-            <a:off x="1103312" y="1673524"/>
-            <a:ext cx="8946541" cy="4940635"/>
+            <a:off x="646111" y="1500996"/>
+            <a:ext cx="10792515" cy="4747403"/>
           </a:xfrm>
         </p:spPr>
         <p:txBody>
-          <a:bodyPr>
-            <a:normAutofit/>
-          </a:bodyPr>
+          <a:bodyPr/>
           <a:lstStyle/>
           <a:p>
             <a:pPr lvl="0">
@@ -13065,7 +12929,7 @@
                 <a:cs typeface="Roboto Slab"/>
                 <a:sym typeface="Roboto Slab"/>
               </a:rPr>
-              <a:t>&lt;!doctype html&gt;</a:t>
+              <a:t>A web page is made up of 3 major sections:</a:t>
             </a:r>
           </a:p>
           <a:p>
@@ -13078,74 +12942,92 @@
               </a:spcBef>
               <a:buNone/>
             </a:pPr>
-            <a:r>
-              <a:rPr lang="en" sz="3200" dirty="0">
-                <a:solidFill>
-                  <a:srgbClr val="92D050"/>
-                </a:solidFill>
-                <a:latin typeface="Calibri" panose="020F0502020204030204" pitchFamily="34" charset="0"/>
-                <a:ea typeface="Roboto Slab"/>
-                <a:cs typeface="Roboto Slab"/>
-                <a:sym typeface="Roboto Slab"/>
-              </a:rPr>
-              <a:t>&lt;html&gt;</a:t>
-            </a:r>
-          </a:p>
-          <a:p>
-            <a:pPr lvl="1">
+            <a:endParaRPr lang="en" sz="3200" dirty="0">
+              <a:latin typeface="Calibri" panose="020F0502020204030204" pitchFamily="34" charset="0"/>
+              <a:ea typeface="Roboto Slab"/>
+              <a:cs typeface="Roboto Slab"/>
+              <a:sym typeface="Roboto Slab"/>
+            </a:endParaRPr>
+          </a:p>
+          <a:p>
+            <a:pPr marL="457200" lvl="0" indent="-381000">
               <a:lnSpc>
                 <a:spcPct val="115000"/>
               </a:lnSpc>
               <a:spcBef>
                 <a:spcPts val="0"/>
               </a:spcBef>
-              <a:buNone/>
+              <a:buSzPct val="100000"/>
+              <a:buFont typeface="Roboto Slab"/>
+              <a:buChar char="●"/>
             </a:pPr>
             <a:r>
               <a:rPr lang="en" sz="3200" dirty="0">
                 <a:solidFill>
-                  <a:srgbClr val="FFC000"/>
+                  <a:srgbClr val="00B0F0"/>
                 </a:solidFill>
                 <a:latin typeface="Calibri" panose="020F0502020204030204" pitchFamily="34" charset="0"/>
                 <a:ea typeface="Roboto Slab"/>
                 <a:cs typeface="Roboto Slab"/>
                 <a:sym typeface="Roboto Slab"/>
               </a:rPr>
-              <a:t>  &lt;head&gt;</a:t>
-            </a:r>
-          </a:p>
-          <a:p>
-            <a:pPr lvl="1">
+              <a:t>head</a:t>
+            </a:r>
+            <a:r>
+              <a:rPr lang="en" sz="3200" dirty="0">
+                <a:latin typeface="Calibri" panose="020F0502020204030204" pitchFamily="34" charset="0"/>
+                <a:ea typeface="Roboto Slab"/>
+                <a:cs typeface="Roboto Slab"/>
+                <a:sym typeface="Roboto Slab"/>
+              </a:rPr>
+              <a:t> - You don’t see the content in here. Defines rules for the page.</a:t>
+            </a:r>
+          </a:p>
+          <a:p>
+            <a:pPr marL="457200" lvl="0" indent="-381000">
               <a:lnSpc>
                 <a:spcPct val="115000"/>
               </a:lnSpc>
               <a:spcBef>
                 <a:spcPts val="0"/>
               </a:spcBef>
-              <a:buNone/>
+              <a:buSzPct val="100000"/>
+              <a:buFont typeface="Roboto Slab"/>
+              <a:buChar char="●"/>
             </a:pPr>
             <a:r>
               <a:rPr lang="en" sz="3200" dirty="0">
                 <a:solidFill>
-                  <a:srgbClr val="FFC000"/>
+                  <a:srgbClr val="00B0F0"/>
                 </a:solidFill>
                 <a:latin typeface="Calibri" panose="020F0502020204030204" pitchFamily="34" charset="0"/>
                 <a:ea typeface="Roboto Slab"/>
                 <a:cs typeface="Roboto Slab"/>
                 <a:sym typeface="Roboto Slab"/>
               </a:rPr>
-              <a:t>  &lt;/head&gt;</a:t>
-            </a:r>
-          </a:p>
-          <a:p>
-            <a:pPr lvl="1">
+              <a:t>body</a:t>
+            </a:r>
+            <a:r>
+              <a:rPr lang="en" sz="3200" dirty="0">
+                <a:latin typeface="Calibri" panose="020F0502020204030204" pitchFamily="34" charset="0"/>
+                <a:ea typeface="Roboto Slab"/>
+                <a:cs typeface="Roboto Slab"/>
+                <a:sym typeface="Roboto Slab"/>
+              </a:rPr>
+              <a:t> - Everything visible goes here. This is where most of your time will be spent.</a:t>
+            </a:r>
+          </a:p>
+          <a:p>
+            <a:pPr marL="457200" lvl="0" indent="-381000">
               <a:lnSpc>
                 <a:spcPct val="115000"/>
               </a:lnSpc>
               <a:spcBef>
                 <a:spcPts val="0"/>
               </a:spcBef>
-              <a:buNone/>
+              <a:buSzPct val="100000"/>
+              <a:buFont typeface="Roboto Slab"/>
+              <a:buChar char="●"/>
             </a:pPr>
             <a:r>
               <a:rPr lang="en" sz="3200" dirty="0">
@@ -13157,76 +13039,27 @@
                 <a:cs typeface="Roboto Slab"/>
                 <a:sym typeface="Roboto Slab"/>
               </a:rPr>
-              <a:t>  &lt;body&gt;</a:t>
-            </a:r>
-          </a:p>
-          <a:p>
-            <a:pPr lvl="1">
-              <a:lnSpc>
-                <a:spcPct val="115000"/>
-              </a:lnSpc>
-              <a:spcBef>
-                <a:spcPts val="0"/>
-              </a:spcBef>
-              <a:buNone/>
-            </a:pPr>
+              <a:t>html </a:t>
+            </a:r>
             <a:r>
               <a:rPr lang="en" sz="3200" dirty="0">
-                <a:solidFill>
-                  <a:srgbClr val="1155CC"/>
-                </a:solidFill>
                 <a:latin typeface="Calibri" panose="020F0502020204030204" pitchFamily="34" charset="0"/>
                 <a:ea typeface="Roboto Slab"/>
                 <a:cs typeface="Roboto Slab"/>
                 <a:sym typeface="Roboto Slab"/>
               </a:rPr>
-              <a:t>  </a:t>
-            </a:r>
-            <a:r>
-              <a:rPr lang="en" sz="3200" dirty="0">
-                <a:solidFill>
-                  <a:srgbClr val="00B0F0"/>
-                </a:solidFill>
-                <a:latin typeface="Calibri" panose="020F0502020204030204" pitchFamily="34" charset="0"/>
-                <a:ea typeface="Roboto Slab"/>
-                <a:cs typeface="Roboto Slab"/>
-                <a:sym typeface="Roboto Slab"/>
-              </a:rPr>
-              <a:t>&lt;/body&gt;</a:t>
-            </a:r>
-          </a:p>
-          <a:p>
-            <a:pPr lvl="0">
-              <a:lnSpc>
-                <a:spcPct val="115000"/>
-              </a:lnSpc>
-              <a:spcBef>
-                <a:spcPts val="0"/>
-              </a:spcBef>
-              <a:buNone/>
-            </a:pPr>
-            <a:r>
-              <a:rPr lang="en" sz="3200" dirty="0">
-                <a:solidFill>
-                  <a:srgbClr val="92D050"/>
-                </a:solidFill>
-                <a:latin typeface="Calibri" panose="020F0502020204030204" pitchFamily="34" charset="0"/>
-                <a:ea typeface="Roboto Slab"/>
-                <a:cs typeface="Roboto Slab"/>
-                <a:sym typeface="Roboto Slab"/>
-              </a:rPr>
-              <a:t>&lt;/html&gt;</a:t>
-            </a:r>
-          </a:p>
-          <a:p>
-            <a:endParaRPr lang="fr-CA" sz="3200" dirty="0"/>
+              <a:t>- Wraps around everything else. Head/Body go inside the html tag.</a:t>
+            </a:r>
+          </a:p>
+          <a:p>
+            <a:endParaRPr lang="fr-CA" dirty="0"/>
           </a:p>
         </p:txBody>
       </p:sp>
     </p:spTree>
     <p:extLst>
       <p:ext uri="{BB962C8B-B14F-4D97-AF65-F5344CB8AC3E}">
-        <p14:creationId xmlns:p14="http://schemas.microsoft.com/office/powerpoint/2010/main" val="1857634281"/>
+        <p14:creationId xmlns:p14="http://schemas.microsoft.com/office/powerpoint/2010/main" val="3851042821"/>
       </p:ext>
     </p:extLst>
   </p:cSld>
@@ -13258,7 +13091,7 @@
           <p:cNvPr id="2" name="Titre 1">
             <a:extLst>
               <a:ext uri="{FF2B5EF4-FFF2-40B4-BE49-F238E27FC236}">
-                <a16:creationId xmlns:a16="http://schemas.microsoft.com/office/drawing/2014/main" id="{FCA28CB8-3CB6-40A2-A503-F61B38B6C5A1}"/>
+                <a16:creationId xmlns:a16="http://schemas.microsoft.com/office/drawing/2014/main" id="{7CA54ABA-7E45-4FCC-A2AC-CA4570B89A83}"/>
               </a:ext>
             </a:extLst>
           </p:cNvPr>
@@ -13269,18 +13102,38 @@
             <p:ph type="title"/>
           </p:nvPr>
         </p:nvSpPr>
-        <p:spPr/>
+        <p:spPr>
+          <a:xfrm>
+            <a:off x="646111" y="452718"/>
+            <a:ext cx="9671081" cy="1100037"/>
+          </a:xfrm>
+        </p:spPr>
         <p:txBody>
           <a:bodyPr/>
           <a:lstStyle/>
           <a:p>
             <a:pPr algn="ctr"/>
             <a:r>
+              <a:rPr lang="en" sz="4400" dirty="0">
+                <a:solidFill>
+                  <a:srgbClr val="FFFFFF"/>
+                </a:solidFill>
+                <a:latin typeface="Calibri" panose="020F0502020204030204" pitchFamily="34" charset="0"/>
+              </a:rPr>
+              <a:t>The skeleton/ </a:t>
+            </a:r>
+            <a:r>
               <a:rPr lang="fr-CA" sz="4400" dirty="0">
-                <a:latin typeface="Calibri" panose="020F0502020204030204" pitchFamily="34" charset="0"/>
-              </a:rPr>
-              <a:t>Course highlight</a:t>
-            </a:r>
+                <a:solidFill>
+                  <a:srgbClr val="FFFFFF"/>
+                </a:solidFill>
+                <a:latin typeface="Calibri" panose="020F0502020204030204" pitchFamily="34" charset="0"/>
+              </a:rPr>
+              <a:t>Format</a:t>
+            </a:r>
+            <a:endParaRPr lang="fr-CA" sz="4400" dirty="0">
+              <a:latin typeface="Calibri" panose="020F0502020204030204" pitchFamily="34" charset="0"/>
+            </a:endParaRPr>
           </a:p>
         </p:txBody>
       </p:sp>
@@ -13289,7 +13142,7 @@
           <p:cNvPr id="3" name="Espace réservé du contenu 2">
             <a:extLst>
               <a:ext uri="{FF2B5EF4-FFF2-40B4-BE49-F238E27FC236}">
-                <a16:creationId xmlns:a16="http://schemas.microsoft.com/office/drawing/2014/main" id="{9883205A-2A30-49A5-B2B2-C276F2B8FE24}"/>
+                <a16:creationId xmlns:a16="http://schemas.microsoft.com/office/drawing/2014/main" id="{B76E426F-E1E9-42F7-A355-5D674FA1AC86}"/>
               </a:ext>
             </a:extLst>
           </p:cNvPr>
@@ -13297,212 +13150,199 @@
             <a:spLocks noGrp="1"/>
           </p:cNvSpPr>
           <p:nvPr>
-            <p:ph sz="half" idx="1"/>
+            <p:ph idx="1"/>
           </p:nvPr>
         </p:nvSpPr>
         <p:spPr>
           <a:xfrm>
-            <a:off x="1103312" y="1853247"/>
-            <a:ext cx="4396339" cy="4823597"/>
+            <a:off x="1103312" y="1673524"/>
+            <a:ext cx="8946541" cy="4940635"/>
           </a:xfrm>
         </p:spPr>
         <p:txBody>
           <a:bodyPr>
-            <a:noAutofit/>
+            <a:normAutofit/>
           </a:bodyPr>
           <a:lstStyle/>
           <a:p>
-            <a:r>
-              <a:rPr lang="en-US" sz="3200" dirty="0">
-                <a:latin typeface="Calibri" panose="020F0502020204030204" pitchFamily="34" charset="0"/>
-              </a:rPr>
-              <a:t>How the Web works</a:t>
-            </a:r>
-            <a:endParaRPr lang="fr-CA" sz="3200" dirty="0">
-              <a:latin typeface="Calibri" panose="020F0502020204030204" pitchFamily="34" charset="0"/>
-            </a:endParaRPr>
-          </a:p>
-          <a:p>
-            <a:r>
-              <a:rPr lang="en-US" sz="3200" dirty="0">
-                <a:latin typeface="Calibri" panose="020F0502020204030204" pitchFamily="34" charset="0"/>
-              </a:rPr>
-              <a:t>HTML documents</a:t>
-            </a:r>
-            <a:endParaRPr lang="fr-CA" sz="3200" dirty="0">
-              <a:latin typeface="Calibri" panose="020F0502020204030204" pitchFamily="34" charset="0"/>
-            </a:endParaRPr>
-          </a:p>
-          <a:p>
-            <a:r>
-              <a:rPr lang="en-US" sz="3200" dirty="0">
-                <a:latin typeface="Calibri" panose="020F0502020204030204" pitchFamily="34" charset="0"/>
-              </a:rPr>
-              <a:t>Nesting</a:t>
-            </a:r>
-            <a:endParaRPr lang="fr-CA" sz="3200" dirty="0">
-              <a:latin typeface="Calibri" panose="020F0502020204030204" pitchFamily="34" charset="0"/>
-            </a:endParaRPr>
-          </a:p>
-          <a:p>
-            <a:r>
-              <a:rPr lang="en-US" sz="3200" dirty="0">
-                <a:latin typeface="Calibri" panose="020F0502020204030204" pitchFamily="34" charset="0"/>
-              </a:rPr>
-              <a:t>Head elements </a:t>
-            </a:r>
-            <a:endParaRPr lang="fr-CA" sz="3200" dirty="0">
-              <a:latin typeface="Calibri" panose="020F0502020204030204" pitchFamily="34" charset="0"/>
-            </a:endParaRPr>
-          </a:p>
-          <a:p>
-            <a:r>
-              <a:rPr lang="en-US" sz="3200" dirty="0">
-                <a:latin typeface="Calibri" panose="020F0502020204030204" pitchFamily="34" charset="0"/>
-              </a:rPr>
-              <a:t>Layout elements</a:t>
-            </a:r>
-            <a:endParaRPr lang="fr-CA" sz="3200" dirty="0">
-              <a:latin typeface="Calibri" panose="020F0502020204030204" pitchFamily="34" charset="0"/>
-            </a:endParaRPr>
-          </a:p>
-          <a:p>
-            <a:r>
-              <a:rPr lang="en-US" sz="3200" dirty="0">
-                <a:latin typeface="Calibri" panose="020F0502020204030204" pitchFamily="34" charset="0"/>
-              </a:rPr>
-              <a:t>Basic Tags </a:t>
-            </a:r>
-            <a:endParaRPr lang="fr-CA" sz="3200" dirty="0">
-              <a:latin typeface="Calibri" panose="020F0502020204030204" pitchFamily="34" charset="0"/>
-            </a:endParaRPr>
-          </a:p>
-          <a:p>
-            <a:r>
-              <a:rPr lang="en-US" sz="3200" dirty="0">
-                <a:latin typeface="Calibri" panose="020F0502020204030204" pitchFamily="34" charset="0"/>
-              </a:rPr>
-              <a:t>Images</a:t>
-            </a:r>
-            <a:endParaRPr lang="fr-CA" sz="3200" dirty="0">
-              <a:latin typeface="Calibri" panose="020F0502020204030204" pitchFamily="34" charset="0"/>
-            </a:endParaRPr>
-          </a:p>
-        </p:txBody>
-      </p:sp>
-      <p:sp>
-        <p:nvSpPr>
-          <p:cNvPr id="4" name="Espace réservé du contenu 3">
-            <a:extLst>
-              <a:ext uri="{FF2B5EF4-FFF2-40B4-BE49-F238E27FC236}">
-                <a16:creationId xmlns:a16="http://schemas.microsoft.com/office/drawing/2014/main" id="{CDC1B2BA-9FBE-41FF-BBCD-6015347D7BF4}"/>
-              </a:ext>
-            </a:extLst>
-          </p:cNvPr>
-          <p:cNvSpPr>
-            <a:spLocks noGrp="1"/>
-          </p:cNvSpPr>
-          <p:nvPr>
-            <p:ph sz="half" idx="2"/>
-          </p:nvPr>
-        </p:nvSpPr>
-        <p:spPr>
-          <a:xfrm>
-            <a:off x="6568893" y="2038839"/>
-            <a:ext cx="4396341" cy="4200245"/>
-          </a:xfrm>
-        </p:spPr>
-        <p:txBody>
-          <a:bodyPr>
-            <a:normAutofit lnSpcReduction="10000"/>
-          </a:bodyPr>
-          <a:lstStyle/>
-          <a:p>
-            <a:r>
-              <a:rPr lang="en-US" sz="3200" dirty="0">
-                <a:latin typeface="Calibri" panose="020F0502020204030204" pitchFamily="34" charset="0"/>
-              </a:rPr>
-              <a:t>Videos</a:t>
-            </a:r>
-            <a:endParaRPr lang="fr-CA" sz="3200" dirty="0">
-              <a:latin typeface="Calibri" panose="020F0502020204030204" pitchFamily="34" charset="0"/>
-            </a:endParaRPr>
-          </a:p>
-          <a:p>
-            <a:r>
-              <a:rPr lang="en-US" sz="3200" dirty="0">
-                <a:latin typeface="Calibri" panose="020F0502020204030204" pitchFamily="34" charset="0"/>
-              </a:rPr>
-              <a:t>Lists(ul, ol)</a:t>
-            </a:r>
-            <a:endParaRPr lang="fr-CA" sz="3200" dirty="0">
-              <a:latin typeface="Calibri" panose="020F0502020204030204" pitchFamily="34" charset="0"/>
-            </a:endParaRPr>
-          </a:p>
-          <a:p>
-            <a:r>
-              <a:rPr lang="en-US" sz="3200" dirty="0">
-                <a:latin typeface="Calibri" panose="020F0502020204030204" pitchFamily="34" charset="0"/>
-              </a:rPr>
-              <a:t>Headings(H1-H6)</a:t>
-            </a:r>
-            <a:endParaRPr lang="fr-CA" sz="3200" dirty="0">
-              <a:latin typeface="Calibri" panose="020F0502020204030204" pitchFamily="34" charset="0"/>
-            </a:endParaRPr>
-          </a:p>
-          <a:p>
-            <a:r>
-              <a:rPr lang="en-US" sz="3200" dirty="0">
-                <a:latin typeface="Calibri" panose="020F0502020204030204" pitchFamily="34" charset="0"/>
-              </a:rPr>
-              <a:t>Paragraph (p)</a:t>
-            </a:r>
-            <a:endParaRPr lang="fr-CA" sz="3200" dirty="0">
-              <a:latin typeface="Calibri" panose="020F0502020204030204" pitchFamily="34" charset="0"/>
-            </a:endParaRPr>
-          </a:p>
-          <a:p>
-            <a:r>
-              <a:rPr lang="en-US" sz="3200" dirty="0">
-                <a:latin typeface="Calibri" panose="020F0502020204030204" pitchFamily="34" charset="0"/>
-              </a:rPr>
-              <a:t>Links (a)</a:t>
-            </a:r>
-            <a:endParaRPr lang="fr-CA" sz="3200" dirty="0">
-              <a:latin typeface="Calibri" panose="020F0502020204030204" pitchFamily="34" charset="0"/>
-            </a:endParaRPr>
-          </a:p>
-          <a:p>
-            <a:r>
-              <a:rPr lang="en-US" sz="3200" dirty="0">
-                <a:latin typeface="Calibri" panose="020F0502020204030204" pitchFamily="34" charset="0"/>
-              </a:rPr>
-              <a:t>Semantic Elements</a:t>
-            </a:r>
-            <a:endParaRPr lang="fr-CA" sz="3200" dirty="0">
-              <a:latin typeface="Calibri" panose="020F0502020204030204" pitchFamily="34" charset="0"/>
-            </a:endParaRPr>
-          </a:p>
-          <a:p>
-            <a:r>
-              <a:rPr lang="en-US" sz="3200" dirty="0">
-                <a:latin typeface="Calibri" panose="020F0502020204030204" pitchFamily="34" charset="0"/>
-              </a:rPr>
-              <a:t>HTML Comments</a:t>
-            </a:r>
-            <a:endParaRPr lang="fr-CA" sz="3200" dirty="0">
-              <a:latin typeface="Calibri" panose="020F0502020204030204" pitchFamily="34" charset="0"/>
-            </a:endParaRPr>
-          </a:p>
-          <a:p>
-            <a:endParaRPr lang="fr-CA" dirty="0"/>
+            <a:pPr lvl="0">
+              <a:lnSpc>
+                <a:spcPct val="115000"/>
+              </a:lnSpc>
+              <a:spcBef>
+                <a:spcPts val="0"/>
+              </a:spcBef>
+              <a:buNone/>
+            </a:pPr>
+            <a:r>
+              <a:rPr lang="en" sz="3200" dirty="0">
+                <a:latin typeface="Calibri" panose="020F0502020204030204" pitchFamily="34" charset="0"/>
+                <a:ea typeface="Roboto Slab"/>
+                <a:cs typeface="Roboto Slab"/>
+                <a:sym typeface="Roboto Slab"/>
+              </a:rPr>
+              <a:t>&lt;!doctype html&gt;</a:t>
+            </a:r>
+          </a:p>
+          <a:p>
+            <a:pPr lvl="0">
+              <a:lnSpc>
+                <a:spcPct val="115000"/>
+              </a:lnSpc>
+              <a:spcBef>
+                <a:spcPts val="0"/>
+              </a:spcBef>
+              <a:buNone/>
+            </a:pPr>
+            <a:r>
+              <a:rPr lang="en" sz="3200" dirty="0">
+                <a:solidFill>
+                  <a:srgbClr val="92D050"/>
+                </a:solidFill>
+                <a:latin typeface="Calibri" panose="020F0502020204030204" pitchFamily="34" charset="0"/>
+                <a:ea typeface="Roboto Slab"/>
+                <a:cs typeface="Roboto Slab"/>
+                <a:sym typeface="Roboto Slab"/>
+              </a:rPr>
+              <a:t>&lt;html&gt;</a:t>
+            </a:r>
+          </a:p>
+          <a:p>
+            <a:pPr lvl="1">
+              <a:lnSpc>
+                <a:spcPct val="115000"/>
+              </a:lnSpc>
+              <a:spcBef>
+                <a:spcPts val="0"/>
+              </a:spcBef>
+              <a:buNone/>
+            </a:pPr>
+            <a:r>
+              <a:rPr lang="en" sz="3200" dirty="0">
+                <a:solidFill>
+                  <a:srgbClr val="FFC000"/>
+                </a:solidFill>
+                <a:latin typeface="Calibri" panose="020F0502020204030204" pitchFamily="34" charset="0"/>
+                <a:ea typeface="Roboto Slab"/>
+                <a:cs typeface="Roboto Slab"/>
+                <a:sym typeface="Roboto Slab"/>
+              </a:rPr>
+              <a:t>  &lt;head&gt;</a:t>
+            </a:r>
+          </a:p>
+          <a:p>
+            <a:pPr lvl="1">
+              <a:lnSpc>
+                <a:spcPct val="115000"/>
+              </a:lnSpc>
+              <a:spcBef>
+                <a:spcPts val="0"/>
+              </a:spcBef>
+              <a:buNone/>
+            </a:pPr>
+            <a:r>
+              <a:rPr lang="en" sz="3200" dirty="0">
+                <a:solidFill>
+                  <a:srgbClr val="FFC000"/>
+                </a:solidFill>
+                <a:latin typeface="Calibri" panose="020F0502020204030204" pitchFamily="34" charset="0"/>
+                <a:ea typeface="Roboto Slab"/>
+                <a:cs typeface="Roboto Slab"/>
+                <a:sym typeface="Roboto Slab"/>
+              </a:rPr>
+              <a:t>  &lt;/head&gt;</a:t>
+            </a:r>
+          </a:p>
+          <a:p>
+            <a:pPr lvl="1">
+              <a:lnSpc>
+                <a:spcPct val="115000"/>
+              </a:lnSpc>
+              <a:spcBef>
+                <a:spcPts val="0"/>
+              </a:spcBef>
+              <a:buNone/>
+            </a:pPr>
+            <a:r>
+              <a:rPr lang="en" sz="3200" dirty="0">
+                <a:solidFill>
+                  <a:srgbClr val="00B0F0"/>
+                </a:solidFill>
+                <a:latin typeface="Calibri" panose="020F0502020204030204" pitchFamily="34" charset="0"/>
+                <a:ea typeface="Roboto Slab"/>
+                <a:cs typeface="Roboto Slab"/>
+                <a:sym typeface="Roboto Slab"/>
+              </a:rPr>
+              <a:t>  &lt;body&gt;</a:t>
+            </a:r>
+          </a:p>
+          <a:p>
+            <a:pPr lvl="1">
+              <a:lnSpc>
+                <a:spcPct val="115000"/>
+              </a:lnSpc>
+              <a:spcBef>
+                <a:spcPts val="0"/>
+              </a:spcBef>
+              <a:buNone/>
+            </a:pPr>
+            <a:r>
+              <a:rPr lang="en" sz="3200" dirty="0">
+                <a:solidFill>
+                  <a:srgbClr val="1155CC"/>
+                </a:solidFill>
+                <a:latin typeface="Calibri" panose="020F0502020204030204" pitchFamily="34" charset="0"/>
+                <a:ea typeface="Roboto Slab"/>
+                <a:cs typeface="Roboto Slab"/>
+                <a:sym typeface="Roboto Slab"/>
+              </a:rPr>
+              <a:t>  </a:t>
+            </a:r>
+            <a:r>
+              <a:rPr lang="en" sz="3200" dirty="0">
+                <a:solidFill>
+                  <a:srgbClr val="00B0F0"/>
+                </a:solidFill>
+                <a:latin typeface="Calibri" panose="020F0502020204030204" pitchFamily="34" charset="0"/>
+                <a:ea typeface="Roboto Slab"/>
+                <a:cs typeface="Roboto Slab"/>
+                <a:sym typeface="Roboto Slab"/>
+              </a:rPr>
+              <a:t>&lt;/body&gt;</a:t>
+            </a:r>
+          </a:p>
+          <a:p>
+            <a:pPr lvl="0">
+              <a:lnSpc>
+                <a:spcPct val="115000"/>
+              </a:lnSpc>
+              <a:spcBef>
+                <a:spcPts val="0"/>
+              </a:spcBef>
+              <a:buNone/>
+            </a:pPr>
+            <a:r>
+              <a:rPr lang="en" sz="3200" dirty="0">
+                <a:solidFill>
+                  <a:srgbClr val="92D050"/>
+                </a:solidFill>
+                <a:latin typeface="Calibri" panose="020F0502020204030204" pitchFamily="34" charset="0"/>
+                <a:ea typeface="Roboto Slab"/>
+                <a:cs typeface="Roboto Slab"/>
+                <a:sym typeface="Roboto Slab"/>
+              </a:rPr>
+              <a:t>&lt;/html&gt;</a:t>
+            </a:r>
+          </a:p>
+          <a:p>
+            <a:endParaRPr lang="fr-CA" sz="3200" dirty="0"/>
           </a:p>
         </p:txBody>
       </p:sp>
     </p:spTree>
     <p:extLst>
       <p:ext uri="{BB962C8B-B14F-4D97-AF65-F5344CB8AC3E}">
-        <p14:creationId xmlns:p14="http://schemas.microsoft.com/office/powerpoint/2010/main" val="1708198595"/>
+        <p14:creationId xmlns:p14="http://schemas.microsoft.com/office/powerpoint/2010/main" val="1857634281"/>
       </p:ext>
     </p:extLst>
   </p:cSld>
@@ -13534,7 +13374,7 @@
           <p:cNvPr id="2" name="Titre 1">
             <a:extLst>
               <a:ext uri="{FF2B5EF4-FFF2-40B4-BE49-F238E27FC236}">
-                <a16:creationId xmlns:a16="http://schemas.microsoft.com/office/drawing/2014/main" id="{E5D25938-ABE7-46FE-B99B-B7916221CE85}"/>
+                <a16:creationId xmlns:a16="http://schemas.microsoft.com/office/drawing/2014/main" id="{FCA28CB8-3CB6-40A2-A503-F61B38B6C5A1}"/>
               </a:ext>
             </a:extLst>
           </p:cNvPr>
@@ -13545,27 +13385,18 @@
             <p:ph type="title"/>
           </p:nvPr>
         </p:nvSpPr>
-        <p:spPr>
-          <a:xfrm>
-            <a:off x="646111" y="452718"/>
-            <a:ext cx="9404723" cy="996520"/>
-          </a:xfrm>
-        </p:spPr>
+        <p:spPr/>
         <p:txBody>
           <a:bodyPr/>
           <a:lstStyle/>
           <a:p>
             <a:pPr algn="ctr"/>
             <a:r>
-              <a:rPr lang="en-CA" sz="4400" dirty="0">
-                <a:latin typeface="Calibri" panose="020F0502020204030204" pitchFamily="34" charset="0"/>
-              </a:rPr>
-              <a:t>Basic Development Tools</a:t>
-            </a:r>
-            <a:br>
-              <a:rPr lang="en-CA" sz="4400" dirty="0"/>
-            </a:br>
-            <a:endParaRPr lang="fr-CA" dirty="0"/>
+              <a:rPr lang="fr-CA" sz="4400" dirty="0">
+                <a:latin typeface="Calibri" panose="020F0502020204030204" pitchFamily="34" charset="0"/>
+              </a:rPr>
+              <a:t>Course highlight</a:t>
+            </a:r>
           </a:p>
         </p:txBody>
       </p:sp>
@@ -13574,7 +13405,7 @@
           <p:cNvPr id="3" name="Espace réservé du contenu 2">
             <a:extLst>
               <a:ext uri="{FF2B5EF4-FFF2-40B4-BE49-F238E27FC236}">
-                <a16:creationId xmlns:a16="http://schemas.microsoft.com/office/drawing/2014/main" id="{6403086F-8815-4DE7-8BEC-17A458EB213C}"/>
+                <a16:creationId xmlns:a16="http://schemas.microsoft.com/office/drawing/2014/main" id="{9883205A-2A30-49A5-B2B2-C276F2B8FE24}"/>
               </a:ext>
             </a:extLst>
           </p:cNvPr>
@@ -13582,126 +13413,200 @@
             <a:spLocks noGrp="1"/>
           </p:cNvSpPr>
           <p:nvPr>
-            <p:ph idx="1"/>
+            <p:ph sz="half" idx="1"/>
           </p:nvPr>
         </p:nvSpPr>
         <p:spPr>
           <a:xfrm>
-            <a:off x="646111" y="1880558"/>
-            <a:ext cx="11210609" cy="4692770"/>
+            <a:off x="1103312" y="1853247"/>
+            <a:ext cx="4396339" cy="4823597"/>
           </a:xfrm>
         </p:spPr>
         <p:txBody>
           <a:bodyPr>
-            <a:normAutofit/>
+            <a:noAutofit/>
           </a:bodyPr>
           <a:lstStyle/>
           <a:p>
             <a:r>
-              <a:rPr lang="en-CA" sz="3200" dirty="0">
-                <a:solidFill>
-                  <a:srgbClr val="00B0F0"/>
-                </a:solidFill>
-                <a:latin typeface="Calibri" panose="020F0502020204030204" pitchFamily="34" charset="0"/>
-              </a:rPr>
-              <a:t>Text Editor </a:t>
-            </a:r>
-            <a:r>
-              <a:rPr lang="en-CA" sz="3200" dirty="0">
-                <a:latin typeface="Calibri" panose="020F0502020204030204" pitchFamily="34" charset="0"/>
-              </a:rPr>
-              <a:t>- Atom, Visual Studio Code, Sublime, WebStorm etc.</a:t>
-            </a:r>
-          </a:p>
-          <a:p>
-            <a:r>
-              <a:rPr lang="en-CA" sz="3200" dirty="0">
-                <a:solidFill>
-                  <a:srgbClr val="00B0F0"/>
-                </a:solidFill>
-                <a:latin typeface="Calibri" panose="020F0502020204030204" pitchFamily="34" charset="0"/>
-              </a:rPr>
-              <a:t>Free Images </a:t>
-            </a:r>
-            <a:r>
-              <a:rPr lang="en-CA" sz="3200" dirty="0">
-                <a:latin typeface="Calibri" panose="020F0502020204030204" pitchFamily="34" charset="0"/>
-              </a:rPr>
-              <a:t>– wocintechchat; unsplash; </a:t>
-            </a:r>
-            <a:r>
-              <a:rPr lang="fr-CA" sz="3200" dirty="0">
-                <a:latin typeface="Calibri" panose="020F0502020204030204" pitchFamily="34" charset="0"/>
-              </a:rPr>
-              <a:t>pixabay etc.</a:t>
-            </a:r>
-            <a:endParaRPr lang="en-CA" sz="3200" dirty="0">
+              <a:rPr lang="en-US" sz="3200" dirty="0">
+                <a:latin typeface="Calibri" panose="020F0502020204030204" pitchFamily="34" charset="0"/>
+              </a:rPr>
+              <a:t>How the Web works</a:t>
+            </a:r>
+            <a:endParaRPr lang="fr-CA" sz="3200" dirty="0">
               <a:latin typeface="Calibri" panose="020F0502020204030204" pitchFamily="34" charset="0"/>
             </a:endParaRPr>
           </a:p>
           <a:p>
             <a:r>
-              <a:rPr lang="en-CA" sz="3200" dirty="0">
-                <a:solidFill>
-                  <a:srgbClr val="00B0F0"/>
-                </a:solidFill>
-                <a:latin typeface="Calibri" panose="020F0502020204030204" pitchFamily="34" charset="0"/>
-              </a:rPr>
-              <a:t>Free Icons </a:t>
-            </a:r>
-            <a:r>
-              <a:rPr lang="en-CA" sz="3200" dirty="0">
-                <a:latin typeface="Calibri" panose="020F0502020204030204" pitchFamily="34" charset="0"/>
-              </a:rPr>
-              <a:t>- flaticon; </a:t>
-            </a:r>
-            <a:r>
-              <a:rPr lang="fr-CA" sz="3200" dirty="0">
-                <a:latin typeface="Calibri" panose="020F0502020204030204" pitchFamily="34" charset="0"/>
-              </a:rPr>
-              <a:t>freepik; fontawesome etc.</a:t>
-            </a:r>
-          </a:p>
-          <a:p>
-            <a:r>
-              <a:rPr lang="en-CA" sz="3200" dirty="0">
-                <a:solidFill>
-                  <a:srgbClr val="00B0F0"/>
-                </a:solidFill>
-                <a:latin typeface="Calibri" panose="020F0502020204030204" pitchFamily="34" charset="0"/>
-              </a:rPr>
-              <a:t>Image Editing </a:t>
-            </a:r>
-            <a:r>
-              <a:rPr lang="en-CA" sz="3200" dirty="0">
-                <a:latin typeface="Calibri" panose="020F0502020204030204" pitchFamily="34" charset="0"/>
-              </a:rPr>
-              <a:t>- Photoshop, Sketch, Gimp,  Canva etc.</a:t>
-            </a:r>
-          </a:p>
-          <a:p>
-            <a:r>
-              <a:rPr lang="en-CA" sz="3200" dirty="0">
-                <a:solidFill>
-                  <a:srgbClr val="00B0F0"/>
-                </a:solidFill>
-                <a:latin typeface="Calibri" panose="020F0502020204030204" pitchFamily="34" charset="0"/>
-              </a:rPr>
-              <a:t>Logo Maker </a:t>
-            </a:r>
-            <a:r>
-              <a:rPr lang="en-CA" sz="3200" dirty="0">
-                <a:latin typeface="Calibri" panose="020F0502020204030204" pitchFamily="34" charset="0"/>
-              </a:rPr>
-              <a:t>- </a:t>
-            </a:r>
-            <a:r>
-              <a:rPr lang="fr-CA" sz="3200" dirty="0">
-                <a:latin typeface="Calibri" panose="020F0502020204030204" pitchFamily="34" charset="0"/>
-              </a:rPr>
-              <a:t>logomakr.com; freelogodesign.org etc.</a:t>
-            </a:r>
-            <a:endParaRPr lang="en-CA" sz="3200" dirty="0">
+              <a:rPr lang="en-US" sz="3200" dirty="0">
+                <a:latin typeface="Calibri" panose="020F0502020204030204" pitchFamily="34" charset="0"/>
+              </a:rPr>
+              <a:t>HTML documents</a:t>
+            </a:r>
+            <a:endParaRPr lang="fr-CA" sz="3200" dirty="0">
+              <a:latin typeface="Calibri" panose="020F0502020204030204" pitchFamily="34" charset="0"/>
+            </a:endParaRPr>
+          </a:p>
+          <a:p>
+            <a:r>
+              <a:rPr lang="en-US" sz="3200" dirty="0">
+                <a:latin typeface="Calibri" panose="020F0502020204030204" pitchFamily="34" charset="0"/>
+              </a:rPr>
+              <a:t>Nesting</a:t>
+            </a:r>
+            <a:endParaRPr lang="fr-CA" sz="3200" dirty="0">
+              <a:latin typeface="Calibri" panose="020F0502020204030204" pitchFamily="34" charset="0"/>
+            </a:endParaRPr>
+          </a:p>
+          <a:p>
+            <a:r>
+              <a:rPr lang="en-US" sz="3200" dirty="0">
+                <a:latin typeface="Calibri" panose="020F0502020204030204" pitchFamily="34" charset="0"/>
+              </a:rPr>
+              <a:t>Head elements </a:t>
+            </a:r>
+            <a:endParaRPr lang="fr-CA" sz="3200" dirty="0">
+              <a:latin typeface="Calibri" panose="020F0502020204030204" pitchFamily="34" charset="0"/>
+            </a:endParaRPr>
+          </a:p>
+          <a:p>
+            <a:r>
+              <a:rPr lang="en-US" sz="3200" dirty="0">
+                <a:latin typeface="Calibri" panose="020F0502020204030204" pitchFamily="34" charset="0"/>
+              </a:rPr>
+              <a:t>Layout elements</a:t>
+            </a:r>
+            <a:endParaRPr lang="fr-CA" sz="3200" dirty="0">
+              <a:latin typeface="Calibri" panose="020F0502020204030204" pitchFamily="34" charset="0"/>
+            </a:endParaRPr>
+          </a:p>
+          <a:p>
+            <a:r>
+              <a:rPr lang="en-US" sz="3200" dirty="0">
+                <a:latin typeface="Calibri" panose="020F0502020204030204" pitchFamily="34" charset="0"/>
+              </a:rPr>
+              <a:t>Basic Tags </a:t>
+            </a:r>
+            <a:endParaRPr lang="fr-CA" sz="3200" dirty="0">
+              <a:latin typeface="Calibri" panose="020F0502020204030204" pitchFamily="34" charset="0"/>
+            </a:endParaRPr>
+          </a:p>
+          <a:p>
+            <a:r>
+              <a:rPr lang="en-US" sz="3200" dirty="0">
+                <a:latin typeface="Calibri" panose="020F0502020204030204" pitchFamily="34" charset="0"/>
+              </a:rPr>
+              <a:t>Images</a:t>
+            </a:r>
+            <a:endParaRPr lang="fr-CA" sz="3200" dirty="0">
+              <a:latin typeface="Calibri" panose="020F0502020204030204" pitchFamily="34" charset="0"/>
+            </a:endParaRPr>
+          </a:p>
+        </p:txBody>
+      </p:sp>
+      <p:sp>
+        <p:nvSpPr>
+          <p:cNvPr id="4" name="Espace réservé du contenu 3">
+            <a:extLst>
+              <a:ext uri="{FF2B5EF4-FFF2-40B4-BE49-F238E27FC236}">
+                <a16:creationId xmlns:a16="http://schemas.microsoft.com/office/drawing/2014/main" id="{CDC1B2BA-9FBE-41FF-BBCD-6015347D7BF4}"/>
+              </a:ext>
+            </a:extLst>
+          </p:cNvPr>
+          <p:cNvSpPr>
+            <a:spLocks noGrp="1"/>
+          </p:cNvSpPr>
+          <p:nvPr>
+            <p:ph sz="half" idx="2"/>
+          </p:nvPr>
+        </p:nvSpPr>
+        <p:spPr>
+          <a:xfrm>
+            <a:off x="6568893" y="2038839"/>
+            <a:ext cx="4396341" cy="4200245"/>
+          </a:xfrm>
+        </p:spPr>
+        <p:txBody>
+          <a:bodyPr>
+            <a:normAutofit lnSpcReduction="10000"/>
+          </a:bodyPr>
+          <a:lstStyle/>
+          <a:p>
+            <a:r>
+              <a:rPr lang="en-US" sz="3200" dirty="0">
+                <a:latin typeface="Calibri" panose="020F0502020204030204" pitchFamily="34" charset="0"/>
+              </a:rPr>
+              <a:t>Videos</a:t>
+            </a:r>
+            <a:endParaRPr lang="fr-CA" sz="3200" dirty="0">
+              <a:latin typeface="Calibri" panose="020F0502020204030204" pitchFamily="34" charset="0"/>
+            </a:endParaRPr>
+          </a:p>
+          <a:p>
+            <a:r>
+              <a:rPr lang="en-US" sz="3200" dirty="0">
+                <a:latin typeface="Calibri" panose="020F0502020204030204" pitchFamily="34" charset="0"/>
+              </a:rPr>
+              <a:t>Lists(ul, ol)</a:t>
+            </a:r>
+            <a:endParaRPr lang="fr-CA" sz="3200" dirty="0">
+              <a:latin typeface="Calibri" panose="020F0502020204030204" pitchFamily="34" charset="0"/>
+            </a:endParaRPr>
+          </a:p>
+          <a:p>
+            <a:r>
+              <a:rPr lang="en-US" sz="3200" dirty="0">
+                <a:latin typeface="Calibri" panose="020F0502020204030204" pitchFamily="34" charset="0"/>
+              </a:rPr>
+              <a:t>Headings(H1-H6)</a:t>
+            </a:r>
+            <a:endParaRPr lang="fr-CA" sz="3200" dirty="0">
+              <a:latin typeface="Calibri" panose="020F0502020204030204" pitchFamily="34" charset="0"/>
+            </a:endParaRPr>
+          </a:p>
+          <a:p>
+            <a:r>
+              <a:rPr lang="en-US" sz="3200" dirty="0">
+                <a:latin typeface="Calibri" panose="020F0502020204030204" pitchFamily="34" charset="0"/>
+              </a:rPr>
+              <a:t>Paragraph (p)</a:t>
+            </a:r>
+            <a:endParaRPr lang="fr-CA" sz="3200" dirty="0">
+              <a:latin typeface="Calibri" panose="020F0502020204030204" pitchFamily="34" charset="0"/>
+            </a:endParaRPr>
+          </a:p>
+          <a:p>
+            <a:r>
+              <a:rPr lang="en-US" sz="3200" dirty="0">
+                <a:latin typeface="Calibri" panose="020F0502020204030204" pitchFamily="34" charset="0"/>
+              </a:rPr>
+              <a:t>Links (a)</a:t>
+            </a:r>
+            <a:endParaRPr lang="fr-CA" sz="3200" dirty="0">
+              <a:latin typeface="Calibri" panose="020F0502020204030204" pitchFamily="34" charset="0"/>
+            </a:endParaRPr>
+          </a:p>
+          <a:p>
+            <a:r>
+              <a:rPr lang="en-US" sz="3200" dirty="0">
+                <a:latin typeface="Calibri" panose="020F0502020204030204" pitchFamily="34" charset="0"/>
+              </a:rPr>
+              <a:t>Semantic Elements</a:t>
+            </a:r>
+            <a:endParaRPr lang="fr-CA" sz="3200" dirty="0">
+              <a:latin typeface="Calibri" panose="020F0502020204030204" pitchFamily="34" charset="0"/>
+            </a:endParaRPr>
+          </a:p>
+          <a:p>
+            <a:r>
+              <a:rPr lang="en-US" sz="3200" dirty="0">
+                <a:latin typeface="Calibri" panose="020F0502020204030204" pitchFamily="34" charset="0"/>
+              </a:rPr>
+              <a:t>HTML Comments</a:t>
+            </a:r>
+            <a:endParaRPr lang="fr-CA" sz="3200" dirty="0">
               <a:latin typeface="Calibri" panose="020F0502020204030204" pitchFamily="34" charset="0"/>
             </a:endParaRPr>
           </a:p>
@@ -13713,7 +13618,7 @@
     </p:spTree>
     <p:extLst>
       <p:ext uri="{BB962C8B-B14F-4D97-AF65-F5344CB8AC3E}">
-        <p14:creationId xmlns:p14="http://schemas.microsoft.com/office/powerpoint/2010/main" val="2475566541"/>
+        <p14:creationId xmlns:p14="http://schemas.microsoft.com/office/powerpoint/2010/main" val="1708198595"/>
       </p:ext>
     </p:extLst>
   </p:cSld>
@@ -13981,7 +13886,7 @@
           </a:p>
           <a:p>
             <a:r>
-              <a:rPr lang="fr-CA" sz="3200" b="1" dirty="0" err="1">
+              <a:rPr lang="fr-CA" sz="3200" dirty="0" err="1">
                 <a:latin typeface="Calibri" panose="020F0502020204030204" pitchFamily="34" charset="0"/>
               </a:rPr>
               <a:t>Syntax</a:t>
@@ -13991,6 +13896,9 @@
             </a:endParaRPr>
           </a:p>
           <a:p>
+            <a:pPr marL="0" indent="0">
+              <a:buNone/>
+            </a:pPr>
             <a:r>
               <a:rPr lang="fr-CA" sz="3200" dirty="0">
                 <a:solidFill>
@@ -13998,12 +13906,12 @@
                 </a:solidFill>
                 <a:latin typeface="Calibri" panose="020F0502020204030204" pitchFamily="34" charset="0"/>
               </a:rPr>
-              <a:t>&lt;tag </a:t>
-            </a:r>
-            <a:r>
-              <a:rPr lang="fr-CA" sz="3200" dirty="0" err="1">
-                <a:solidFill>
-                  <a:srgbClr val="00B0F0"/>
+              <a:t>	&lt;tag </a:t>
+            </a:r>
+            <a:r>
+              <a:rPr lang="fr-CA" sz="3200" dirty="0">
+                <a:solidFill>
+                  <a:srgbClr val="92D050"/>
                 </a:solidFill>
                 <a:latin typeface="Calibri" panose="020F0502020204030204" pitchFamily="34" charset="0"/>
               </a:rPr>
@@ -14016,25 +13924,40 @@
                 </a:solidFill>
                 <a:latin typeface="Calibri" panose="020F0502020204030204" pitchFamily="34" charset="0"/>
               </a:rPr>
-              <a:t>="value"&gt;</a:t>
-            </a:r>
-            <a:r>
-              <a:rPr lang="fr-CA" sz="3200" dirty="0" err="1">
-                <a:solidFill>
-                  <a:srgbClr val="00B0F0"/>
-                </a:solidFill>
-                <a:latin typeface="Calibri" panose="020F0502020204030204" pitchFamily="34" charset="0"/>
-              </a:rPr>
-              <a:t>Your</a:t>
+              <a:t>="</a:t>
             </a:r>
             <a:r>
               <a:rPr lang="fr-CA" sz="3200" dirty="0">
                 <a:solidFill>
-                  <a:srgbClr val="00B0F0"/>
-                </a:solidFill>
-                <a:latin typeface="Calibri" panose="020F0502020204030204" pitchFamily="34" charset="0"/>
-              </a:rPr>
-              <a:t> Text&lt;/tag&gt;</a:t>
+                  <a:srgbClr val="FFC000"/>
+                </a:solidFill>
+                <a:latin typeface="Calibri" panose="020F0502020204030204" pitchFamily="34" charset="0"/>
+              </a:rPr>
+              <a:t>value</a:t>
+            </a:r>
+            <a:r>
+              <a:rPr lang="fr-CA" sz="3200" dirty="0">
+                <a:solidFill>
+                  <a:srgbClr val="00B0F0"/>
+                </a:solidFill>
+                <a:latin typeface="Calibri" panose="020F0502020204030204" pitchFamily="34" charset="0"/>
+              </a:rPr>
+              <a:t>"&gt;</a:t>
+            </a:r>
+            <a:r>
+              <a:rPr lang="fr-CA" sz="3200" dirty="0">
+                <a:latin typeface="Calibri" panose="020F0502020204030204" pitchFamily="34" charset="0"/>
+              </a:rPr>
+              <a:t>Your Text</a:t>
+            </a:r>
+            <a:r>
+              <a:rPr lang="fr-CA" sz="3200" dirty="0">
+                <a:solidFill>
+                  <a:srgbClr val="00B0F0"/>
+                </a:solidFill>
+                <a:latin typeface="Calibri" panose="020F0502020204030204" pitchFamily="34" charset="0"/>
+              </a:rPr>
+              <a:t>&lt;/tag&gt;</a:t>
             </a:r>
           </a:p>
         </p:txBody>

</xml_diff>